<commit_message>
Updates slide decks for all modules with consistent content formatting and other small tweaks
</commit_message>
<xml_diff>
--- a/Module1-Xamarin/Slides/Mobile DevOps Module 1.pptx
+++ b/Module1-Xamarin/Slides/Mobile DevOps Module 1.pptx
@@ -6,10 +6,10 @@
     <p:sldMasterId id="2147484310" r:id="rId5"/>
   </p:sldMasterIdLst>
   <p:notesMasterIdLst>
-    <p:notesMasterId r:id="rId24"/>
+    <p:notesMasterId r:id="rId25"/>
   </p:notesMasterIdLst>
   <p:handoutMasterIdLst>
-    <p:handoutMasterId r:id="rId25"/>
+    <p:handoutMasterId r:id="rId26"/>
   </p:handoutMasterIdLst>
   <p:sldIdLst>
     <p:sldId id="1473" r:id="rId6"/>
@@ -24,12 +24,13 @@
     <p:sldId id="1487" r:id="rId15"/>
     <p:sldId id="1478" r:id="rId16"/>
     <p:sldId id="1494" r:id="rId17"/>
-    <p:sldId id="1461" r:id="rId18"/>
-    <p:sldId id="1485" r:id="rId19"/>
-    <p:sldId id="1490" r:id="rId20"/>
-    <p:sldId id="1489" r:id="rId21"/>
-    <p:sldId id="1416" r:id="rId22"/>
-    <p:sldId id="1326" r:id="rId23"/>
+    <p:sldId id="1495" r:id="rId18"/>
+    <p:sldId id="1461" r:id="rId19"/>
+    <p:sldId id="1485" r:id="rId20"/>
+    <p:sldId id="1490" r:id="rId21"/>
+    <p:sldId id="1489" r:id="rId22"/>
+    <p:sldId id="1416" r:id="rId23"/>
+    <p:sldId id="1326" r:id="rId24"/>
   </p:sldIdLst>
   <p:sldSz cx="12436475" cy="6994525"/>
   <p:notesSz cx="6858000" cy="9144000"/>
@@ -145,6 +146,7 @@
             <p14:sldId id="1487"/>
             <p14:sldId id="1478"/>
             <p14:sldId id="1494"/>
+            <p14:sldId id="1495"/>
             <p14:sldId id="1461"/>
             <p14:sldId id="1485"/>
             <p14:sldId id="1490"/>
@@ -278,7 +280,7 @@
               <a:rPr lang="en-US" smtClean="0">
                 <a:latin typeface="Segoe UI" pitchFamily="34" charset="0"/>
               </a:rPr>
-              <a:t>3/28/2016 12:28 PM</a:t>
+              <a:t>3/28/2016 1:32 PM</a:t>
             </a:fld>
             <a:endParaRPr lang="en-US" dirty="0">
               <a:latin typeface="Segoe UI" pitchFamily="34" charset="0"/>
@@ -559,7 +561,7 @@
           <a:p>
             <a:fld id="{38EEC551-8CDA-4EB6-89BB-2A86C9F091C8}" type="datetime8">
               <a:rPr lang="en-US" smtClean="0"/>
-              <a:t>3/28/2016 12:28 PM</a:t>
+              <a:t>3/28/2016 1:32 PM</a:t>
             </a:fld>
             <a:endParaRPr lang="en-US" dirty="0"/>
           </a:p>
@@ -945,7 +947,7 @@
           <a:p>
             <a:fld id="{38EEC551-8CDA-4EB6-89BB-2A86C9F091C8}" type="datetime8">
               <a:rPr lang="en-US" smtClean="0"/>
-              <a:t>3/28/2016 12:28 PM</a:t>
+              <a:t>3/28/2016 1:32 PM</a:t>
             </a:fld>
             <a:endParaRPr lang="en-US" dirty="0"/>
           </a:p>
@@ -1126,7 +1128,7 @@
           <a:p>
             <a:fld id="{38EEC551-8CDA-4EB6-89BB-2A86C9F091C8}" type="datetime8">
               <a:rPr lang="en-US" smtClean="0"/>
-              <a:t>3/28/2016 1:21 PM</a:t>
+              <a:t>3/28/2016 1:32 PM</a:t>
             </a:fld>
             <a:endParaRPr lang="en-US" dirty="0"/>
           </a:p>
@@ -1213,21 +1215,18 @@
           <a:bodyPr/>
           <a:lstStyle/>
           <a:p>
-            <a:r>
-              <a:rPr lang="en-US" dirty="0"/>
-              <a:t>Time: TBD</a:t>
-            </a:r>
+            <a:endParaRPr lang="en-US" dirty="0"/>
           </a:p>
         </p:txBody>
       </p:sp>
       <p:sp>
         <p:nvSpPr>
-          <p:cNvPr id="4" name="Slide Number Placeholder 3"/>
+          <p:cNvPr id="4" name="Header Placeholder 3"/>
           <p:cNvSpPr>
             <a:spLocks noGrp="1"/>
           </p:cNvSpPr>
           <p:nvPr>
-            <p:ph type="sldNum" sz="quarter" idx="10"/>
+            <p:ph type="hdr" sz="quarter" idx="10"/>
           </p:nvPr>
         </p:nvSpPr>
         <p:spPr/>
@@ -1235,78 +1234,115 @@
           <a:bodyPr/>
           <a:lstStyle/>
           <a:p>
-            <a:pPr marL="0" marR="0" lvl="0" indent="0" algn="r" defTabSz="914400" rtl="0" eaLnBrk="1" fontAlgn="auto" latinLnBrk="0" hangingPunct="1">
-              <a:lnSpc>
-                <a:spcPct val="100000"/>
-              </a:lnSpc>
-              <a:spcBef>
-                <a:spcPts val="0"/>
-              </a:spcBef>
-              <a:spcAft>
-                <a:spcPts val="0"/>
-              </a:spcAft>
-              <a:buClrTx/>
-              <a:buSzTx/>
-              <a:buFontTx/>
-              <a:buNone/>
-              <a:tabLst/>
-              <a:defRPr/>
-            </a:pPr>
-            <a:fld id="{0EA2900F-B82C-4F11-85DB-97B88AAD310C}" type="slidenum">
-              <a:rPr kumimoji="0" lang="en-US" sz="1200" b="0" i="0" u="none" strike="noStrike" kern="1200" cap="none" spc="0" normalizeH="0" baseline="0" noProof="0" smtClean="0">
-                <a:ln>
-                  <a:noFill/>
-                </a:ln>
-                <a:solidFill>
-                  <a:prstClr val="black"/>
-                </a:solidFill>
-                <a:effectLst/>
-                <a:uLnTx/>
-                <a:uFillTx/>
-                <a:latin typeface="Calibri" panose="020F0502020204030204"/>
-                <a:ea typeface="+mn-ea"/>
-                <a:cs typeface="+mn-cs"/>
+            <a:endParaRPr lang="en-US" dirty="0"/>
+          </a:p>
+        </p:txBody>
+      </p:sp>
+      <p:sp>
+        <p:nvSpPr>
+          <p:cNvPr id="5" name="Footer Placeholder 4"/>
+          <p:cNvSpPr>
+            <a:spLocks noGrp="1"/>
+          </p:cNvSpPr>
+          <p:nvPr>
+            <p:ph type="ftr" sz="quarter" idx="11"/>
+          </p:nvPr>
+        </p:nvSpPr>
+        <p:spPr/>
+        <p:txBody>
+          <a:bodyPr/>
+          <a:lstStyle/>
+          <a:p>
+            <a:pPr defTabSz="914099" eaLnBrk="0" hangingPunct="0"/>
+            <a:r>
+              <a:rPr lang="en-US" sz="400">
+                <a:gradFill>
+                  <a:gsLst>
+                    <a:gs pos="0">
+                      <a:prstClr val="black"/>
+                    </a:gs>
+                    <a:gs pos="100000">
+                      <a:prstClr val="black"/>
+                    </a:gs>
+                  </a:gsLst>
+                  <a:lin ang="5400000" scaled="0"/>
+                </a:gradFill>
+                <a:latin typeface="Segoe UI" pitchFamily="34" charset="0"/>
+                <a:ea typeface="Segoe UI" pitchFamily="34" charset="0"/>
+                <a:cs typeface="Segoe UI" pitchFamily="34" charset="0"/>
               </a:rPr>
-              <a:pPr marL="0" marR="0" lvl="0" indent="0" algn="r" defTabSz="914400" rtl="0" eaLnBrk="1" fontAlgn="auto" latinLnBrk="0" hangingPunct="1">
-                <a:lnSpc>
-                  <a:spcPct val="100000"/>
-                </a:lnSpc>
-                <a:spcBef>
-                  <a:spcPts val="0"/>
-                </a:spcBef>
-                <a:spcAft>
-                  <a:spcPts val="0"/>
-                </a:spcAft>
-                <a:buClrTx/>
-                <a:buSzTx/>
-                <a:buFontTx/>
-                <a:buNone/>
-                <a:tabLst/>
-                <a:defRPr/>
-              </a:pPr>
+              <a:t>© 2014 Microsoft Corporation. All rights reserved. MICROSOFT MAKES NO WARRANTIES, EXPRESS, IMPLIED OR STATUTORY, AS TO THE INFORMATION IN THIS PRESENTATION.</a:t>
+            </a:r>
+            <a:endParaRPr lang="en-US" sz="400" dirty="0">
+              <a:gradFill>
+                <a:gsLst>
+                  <a:gs pos="0">
+                    <a:prstClr val="black"/>
+                  </a:gs>
+                  <a:gs pos="100000">
+                    <a:prstClr val="black"/>
+                  </a:gs>
+                </a:gsLst>
+                <a:lin ang="5400000" scaled="0"/>
+              </a:gradFill>
+              <a:latin typeface="Segoe UI" pitchFamily="34" charset="0"/>
+              <a:ea typeface="Segoe UI" pitchFamily="34" charset="0"/>
+              <a:cs typeface="Segoe UI" pitchFamily="34" charset="0"/>
+            </a:endParaRPr>
+          </a:p>
+        </p:txBody>
+      </p:sp>
+      <p:sp>
+        <p:nvSpPr>
+          <p:cNvPr id="6" name="Date Placeholder 5"/>
+          <p:cNvSpPr>
+            <a:spLocks noGrp="1"/>
+          </p:cNvSpPr>
+          <p:nvPr>
+            <p:ph type="dt" idx="12"/>
+          </p:nvPr>
+        </p:nvSpPr>
+        <p:spPr/>
+        <p:txBody>
+          <a:bodyPr/>
+          <a:lstStyle/>
+          <a:p>
+            <a:fld id="{38EEC551-8CDA-4EB6-89BB-2A86C9F091C8}" type="datetime8">
+              <a:rPr lang="en-US" smtClean="0"/>
+              <a:t>3/28/2016 2:33 PM</a:t>
+            </a:fld>
+            <a:endParaRPr lang="en-US" dirty="0"/>
+          </a:p>
+        </p:txBody>
+      </p:sp>
+      <p:sp>
+        <p:nvSpPr>
+          <p:cNvPr id="7" name="Slide Number Placeholder 6"/>
+          <p:cNvSpPr>
+            <a:spLocks noGrp="1"/>
+          </p:cNvSpPr>
+          <p:nvPr>
+            <p:ph type="sldNum" sz="quarter" idx="13"/>
+          </p:nvPr>
+        </p:nvSpPr>
+        <p:spPr/>
+        <p:txBody>
+          <a:bodyPr/>
+          <a:lstStyle/>
+          <a:p>
+            <a:fld id="{B4008EB6-D09E-4580-8CD6-DDB14511944F}" type="slidenum">
+              <a:rPr lang="en-US" smtClean="0"/>
+              <a:pPr/>
               <a:t>13</a:t>
             </a:fld>
-            <a:endParaRPr kumimoji="0" lang="en-US" sz="1200" b="0" i="0" u="none" strike="noStrike" kern="1200" cap="none" spc="0" normalizeH="0" baseline="0" noProof="0">
-              <a:ln>
-                <a:noFill/>
-              </a:ln>
-              <a:solidFill>
-                <a:prstClr val="black"/>
-              </a:solidFill>
-              <a:effectLst/>
-              <a:uLnTx/>
-              <a:uFillTx/>
-              <a:latin typeface="Calibri" panose="020F0502020204030204"/>
-              <a:ea typeface="+mn-ea"/>
-              <a:cs typeface="+mn-cs"/>
-            </a:endParaRPr>
+            <a:endParaRPr lang="en-US" dirty="0"/>
           </a:p>
         </p:txBody>
       </p:sp>
     </p:spTree>
     <p:extLst>
       <p:ext uri="{BB962C8B-B14F-4D97-AF65-F5344CB8AC3E}">
-        <p14:creationId xmlns:p14="http://schemas.microsoft.com/office/powerpoint/2010/main" val="3840206939"/>
+        <p14:creationId xmlns:p14="http://schemas.microsoft.com/office/powerpoint/2010/main" val="3720277747"/>
       </p:ext>
     </p:extLst>
   </p:cSld>
@@ -1453,7 +1489,7 @@
     </p:spTree>
     <p:extLst>
       <p:ext uri="{BB962C8B-B14F-4D97-AF65-F5344CB8AC3E}">
-        <p14:creationId xmlns:p14="http://schemas.microsoft.com/office/powerpoint/2010/main" val="218865484"/>
+        <p14:creationId xmlns:p14="http://schemas.microsoft.com/office/powerpoint/2010/main" val="3840206939"/>
       </p:ext>
     </p:extLst>
   </p:cSld>
@@ -1508,162 +1544,20 @@
           <a:lstStyle/>
           <a:p>
             <a:r>
-              <a:rPr lang="en-US" sz="900" b="1" dirty="0"/>
-              <a:t>Share Your Story for Challenge Points Speaker Notes:</a:t>
-            </a:r>
-          </a:p>
-          <a:p>
-            <a:endParaRPr lang="en-US" sz="900" kern="1200" dirty="0">
-              <a:solidFill>
-                <a:schemeClr val="tx1"/>
-              </a:solidFill>
-              <a:effectLst/>
-              <a:latin typeface="Segoe UI Light" pitchFamily="34" charset="0"/>
-              <a:ea typeface="+mn-ea"/>
-              <a:cs typeface="+mn-cs"/>
-            </a:endParaRPr>
-          </a:p>
-          <a:p>
-            <a:r>
-              <a:rPr lang="en-US" sz="900" kern="1200" dirty="0">
-                <a:solidFill>
-                  <a:schemeClr val="tx1"/>
-                </a:solidFill>
-                <a:effectLst/>
-                <a:latin typeface="Segoe UI Light" pitchFamily="34" charset="0"/>
-                <a:ea typeface="+mn-ea"/>
-                <a:cs typeface="+mn-cs"/>
-              </a:rPr>
-              <a:t>Given that the next speaker will typically need access to your room right after your talk we recommend you encourage everyone to form up around the flash voting sign for the 3 minute feedback activity, and to then stick around to chat with you right after.  This approach will benefit participants who want to speak with you after the talk but who are also interested in participating in the feedback activity.  </a:t>
-            </a:r>
-          </a:p>
-          <a:p>
-            <a:r>
-              <a:rPr lang="en-US" sz="900" kern="1200" dirty="0">
-                <a:solidFill>
-                  <a:schemeClr val="tx1"/>
-                </a:solidFill>
-                <a:effectLst/>
-                <a:latin typeface="Segoe UI Light" pitchFamily="34" charset="0"/>
-                <a:ea typeface="+mn-ea"/>
-                <a:cs typeface="+mn-cs"/>
-              </a:rPr>
-              <a:t> </a:t>
-            </a:r>
-          </a:p>
-          <a:p>
-            <a:r>
-              <a:rPr lang="en-US" sz="900" kern="1200" dirty="0">
-                <a:solidFill>
-                  <a:schemeClr val="tx1"/>
-                </a:solidFill>
-                <a:effectLst/>
-                <a:latin typeface="Segoe UI Light" pitchFamily="34" charset="0"/>
-                <a:ea typeface="+mn-ea"/>
-                <a:cs typeface="+mn-cs"/>
-              </a:rPr>
-              <a:t>Emphasize that the attendees who participate in flash voting about their work, in depth feedback sessions, or registering for</a:t>
-            </a:r>
-            <a:r>
-              <a:rPr lang="en-US" sz="900" kern="1200" baseline="0" dirty="0">
-                <a:solidFill>
-                  <a:schemeClr val="tx1"/>
-                </a:solidFill>
-                <a:effectLst/>
-                <a:latin typeface="Segoe UI Light" pitchFamily="34" charset="0"/>
-                <a:ea typeface="+mn-ea"/>
-                <a:cs typeface="+mn-cs"/>
-              </a:rPr>
-              <a:t> future opportunities </a:t>
-            </a:r>
-            <a:r>
-              <a:rPr lang="en-US" sz="900" kern="1200" dirty="0">
-                <a:solidFill>
-                  <a:schemeClr val="tx1"/>
-                </a:solidFill>
-                <a:effectLst/>
-                <a:latin typeface="Segoe UI Light" pitchFamily="34" charset="0"/>
-                <a:ea typeface="+mn-ea"/>
-                <a:cs typeface="+mn-cs"/>
-              </a:rPr>
-              <a:t>will get //build Challenge</a:t>
-            </a:r>
-            <a:r>
-              <a:rPr lang="en-US" sz="900" kern="1200" baseline="0" dirty="0">
-                <a:solidFill>
-                  <a:schemeClr val="tx1"/>
-                </a:solidFill>
-                <a:effectLst/>
-                <a:latin typeface="Segoe UI Light" pitchFamily="34" charset="0"/>
-                <a:ea typeface="+mn-ea"/>
-                <a:cs typeface="+mn-cs"/>
-              </a:rPr>
-              <a:t> P</a:t>
-            </a:r>
-            <a:r>
-              <a:rPr lang="en-US" sz="900" kern="1200" dirty="0">
-                <a:solidFill>
-                  <a:schemeClr val="tx1"/>
-                </a:solidFill>
-                <a:effectLst/>
-                <a:latin typeface="Segoe UI Light" pitchFamily="34" charset="0"/>
-                <a:ea typeface="+mn-ea"/>
-                <a:cs typeface="+mn-cs"/>
-              </a:rPr>
-              <a:t>oints for doing these activities.  Encourage them to swing by </a:t>
-            </a:r>
-            <a:r>
-              <a:rPr lang="en-US" sz="900" strike="noStrike" kern="1200" dirty="0">
-                <a:solidFill>
-                  <a:schemeClr val="tx1"/>
-                </a:solidFill>
-                <a:effectLst/>
-                <a:latin typeface="Segoe UI Light" pitchFamily="34" charset="0"/>
-                <a:ea typeface="+mn-ea"/>
-                <a:cs typeface="+mn-cs"/>
-              </a:rPr>
-              <a:t>the </a:t>
-            </a:r>
-            <a:r>
-              <a:rPr lang="en-US" sz="900" strike="noStrike" dirty="0">
-                <a:cs typeface="Segoe UI Semibold" panose="020B0702040204020203" pitchFamily="34" charset="0"/>
-              </a:rPr>
-              <a:t>Visual Studio: Share Your Story </a:t>
-            </a:r>
-            <a:r>
-              <a:rPr lang="en-US" sz="900" strike="noStrike" dirty="0"/>
-              <a:t>booth to get more</a:t>
-            </a:r>
-            <a:r>
-              <a:rPr lang="en-US" sz="900" strike="noStrike" baseline="0" dirty="0"/>
-              <a:t> details about additional Challenge Point opportunities</a:t>
-            </a:r>
-            <a:r>
-              <a:rPr lang="en-US" sz="900" kern="1200" dirty="0">
-                <a:solidFill>
-                  <a:schemeClr val="tx1"/>
-                </a:solidFill>
-                <a:effectLst/>
-                <a:latin typeface="Segoe UI Light" pitchFamily="34" charset="0"/>
-                <a:ea typeface="+mn-ea"/>
-                <a:cs typeface="+mn-cs"/>
-              </a:rPr>
-              <a:t>.  </a:t>
-            </a:r>
-          </a:p>
-          <a:p>
-            <a:endParaRPr lang="en-US" dirty="0"/>
+              <a:rPr lang="en-US" dirty="0"/>
+              <a:t>Time: TBD</a:t>
+            </a:r>
           </a:p>
         </p:txBody>
       </p:sp>
       <p:sp>
         <p:nvSpPr>
-          <p:cNvPr id="4" name="Header Placeholder 3"/>
+          <p:cNvPr id="4" name="Slide Number Placeholder 3"/>
           <p:cNvSpPr>
             <a:spLocks noGrp="1"/>
           </p:cNvSpPr>
           <p:nvPr>
-            <p:ph type="hdr" sz="quarter" idx="10"/>
+            <p:ph type="sldNum" sz="quarter" idx="10"/>
           </p:nvPr>
         </p:nvSpPr>
         <p:spPr/>
@@ -1671,119 +1565,78 @@
           <a:bodyPr/>
           <a:lstStyle/>
           <a:p>
-            <a:r>
-              <a:rPr lang="en-US"/>
-              <a:t>Microsoft Build 2016</a:t>
-            </a:r>
-            <a:endParaRPr lang="en-US" dirty="0"/>
-          </a:p>
-        </p:txBody>
-      </p:sp>
-      <p:sp>
-        <p:nvSpPr>
-          <p:cNvPr id="5" name="Footer Placeholder 4"/>
-          <p:cNvSpPr>
-            <a:spLocks noGrp="1"/>
-          </p:cNvSpPr>
-          <p:nvPr>
-            <p:ph type="ftr" sz="quarter" idx="11"/>
-          </p:nvPr>
-        </p:nvSpPr>
-        <p:spPr/>
-        <p:txBody>
-          <a:bodyPr/>
-          <a:lstStyle/>
-          <a:p>
-            <a:pPr defTabSz="914099" eaLnBrk="0" hangingPunct="0"/>
-            <a:r>
-              <a:rPr lang="en-US" sz="400">
-                <a:gradFill>
-                  <a:gsLst>
-                    <a:gs pos="0">
-                      <a:prstClr val="black"/>
-                    </a:gs>
-                    <a:gs pos="100000">
-                      <a:prstClr val="black"/>
-                    </a:gs>
-                  </a:gsLst>
-                  <a:lin ang="5400000" scaled="0"/>
-                </a:gradFill>
-                <a:latin typeface="Segoe UI" pitchFamily="34" charset="0"/>
-                <a:ea typeface="Segoe UI" pitchFamily="34" charset="0"/>
-                <a:cs typeface="Segoe UI" pitchFamily="34" charset="0"/>
+            <a:pPr marL="0" marR="0" lvl="0" indent="0" algn="r" defTabSz="914400" rtl="0" eaLnBrk="1" fontAlgn="auto" latinLnBrk="0" hangingPunct="1">
+              <a:lnSpc>
+                <a:spcPct val="100000"/>
+              </a:lnSpc>
+              <a:spcBef>
+                <a:spcPts val="0"/>
+              </a:spcBef>
+              <a:spcAft>
+                <a:spcPts val="0"/>
+              </a:spcAft>
+              <a:buClrTx/>
+              <a:buSzTx/>
+              <a:buFontTx/>
+              <a:buNone/>
+              <a:tabLst/>
+              <a:defRPr/>
+            </a:pPr>
+            <a:fld id="{0EA2900F-B82C-4F11-85DB-97B88AAD310C}" type="slidenum">
+              <a:rPr kumimoji="0" lang="en-US" sz="1200" b="0" i="0" u="none" strike="noStrike" kern="1200" cap="none" spc="0" normalizeH="0" baseline="0" noProof="0" smtClean="0">
+                <a:ln>
+                  <a:noFill/>
+                </a:ln>
+                <a:solidFill>
+                  <a:prstClr val="black"/>
+                </a:solidFill>
+                <a:effectLst/>
+                <a:uLnTx/>
+                <a:uFillTx/>
+                <a:latin typeface="Calibri" panose="020F0502020204030204"/>
+                <a:ea typeface="+mn-ea"/>
+                <a:cs typeface="+mn-cs"/>
               </a:rPr>
-              <a:t>© 2016 Microsoft Corporation. All rights reserved. MICROSOFT MAKES NO WARRANTIES, EXPRESS, IMPLIED OR STATUTORY, AS TO THE INFORMATION IN THIS PRESENTATION.</a:t>
-            </a:r>
-            <a:endParaRPr lang="en-US" sz="400" dirty="0">
-              <a:gradFill>
-                <a:gsLst>
-                  <a:gs pos="0">
-                    <a:prstClr val="black"/>
-                  </a:gs>
-                  <a:gs pos="100000">
-                    <a:prstClr val="black"/>
-                  </a:gs>
-                </a:gsLst>
-                <a:lin ang="5400000" scaled="0"/>
-              </a:gradFill>
-              <a:latin typeface="Segoe UI" pitchFamily="34" charset="0"/>
-              <a:ea typeface="Segoe UI" pitchFamily="34" charset="0"/>
-              <a:cs typeface="Segoe UI" pitchFamily="34" charset="0"/>
-            </a:endParaRPr>
-          </a:p>
-        </p:txBody>
-      </p:sp>
-      <p:sp>
-        <p:nvSpPr>
-          <p:cNvPr id="6" name="Date Placeholder 5"/>
-          <p:cNvSpPr>
-            <a:spLocks noGrp="1"/>
-          </p:cNvSpPr>
-          <p:nvPr>
-            <p:ph type="dt" idx="12"/>
-          </p:nvPr>
-        </p:nvSpPr>
-        <p:spPr/>
-        <p:txBody>
-          <a:bodyPr/>
-          <a:lstStyle/>
-          <a:p>
-            <a:fld id="{38EEC551-8CDA-4EB6-89BB-2A86C9F091C8}" type="datetime8">
-              <a:rPr lang="en-US" smtClean="0"/>
-              <a:t>3/28/2016 12:28 PM</a:t>
-            </a:fld>
-            <a:endParaRPr lang="en-US" dirty="0"/>
-          </a:p>
-        </p:txBody>
-      </p:sp>
-      <p:sp>
-        <p:nvSpPr>
-          <p:cNvPr id="7" name="Slide Number Placeholder 6"/>
-          <p:cNvSpPr>
-            <a:spLocks noGrp="1"/>
-          </p:cNvSpPr>
-          <p:nvPr>
-            <p:ph type="sldNum" sz="quarter" idx="13"/>
-          </p:nvPr>
-        </p:nvSpPr>
-        <p:spPr/>
-        <p:txBody>
-          <a:bodyPr/>
-          <a:lstStyle/>
-          <a:p>
-            <a:fld id="{B4008EB6-D09E-4580-8CD6-DDB14511944F}" type="slidenum">
-              <a:rPr lang="en-US" smtClean="0"/>
-              <a:pPr/>
+              <a:pPr marL="0" marR="0" lvl="0" indent="0" algn="r" defTabSz="914400" rtl="0" eaLnBrk="1" fontAlgn="auto" latinLnBrk="0" hangingPunct="1">
+                <a:lnSpc>
+                  <a:spcPct val="100000"/>
+                </a:lnSpc>
+                <a:spcBef>
+                  <a:spcPts val="0"/>
+                </a:spcBef>
+                <a:spcAft>
+                  <a:spcPts val="0"/>
+                </a:spcAft>
+                <a:buClrTx/>
+                <a:buSzTx/>
+                <a:buFontTx/>
+                <a:buNone/>
+                <a:tabLst/>
+                <a:defRPr/>
+              </a:pPr>
               <a:t>15</a:t>
             </a:fld>
-            <a:endParaRPr lang="en-US" dirty="0"/>
+            <a:endParaRPr kumimoji="0" lang="en-US" sz="1200" b="0" i="0" u="none" strike="noStrike" kern="1200" cap="none" spc="0" normalizeH="0" baseline="0" noProof="0">
+              <a:ln>
+                <a:noFill/>
+              </a:ln>
+              <a:solidFill>
+                <a:prstClr val="black"/>
+              </a:solidFill>
+              <a:effectLst/>
+              <a:uLnTx/>
+              <a:uFillTx/>
+              <a:latin typeface="Calibri" panose="020F0502020204030204"/>
+              <a:ea typeface="+mn-ea"/>
+              <a:cs typeface="+mn-cs"/>
+            </a:endParaRPr>
           </a:p>
         </p:txBody>
       </p:sp>
     </p:spTree>
     <p:extLst>
       <p:ext uri="{BB962C8B-B14F-4D97-AF65-F5344CB8AC3E}">
-        <p14:creationId xmlns:p14="http://schemas.microsoft.com/office/powerpoint/2010/main" val="1829344038"/>
+        <p14:creationId xmlns:p14="http://schemas.microsoft.com/office/powerpoint/2010/main" val="218865484"/>
       </p:ext>
     </p:extLst>
   </p:cSld>
@@ -1982,26 +1835,18 @@
             </a:r>
           </a:p>
           <a:p>
-            <a:endParaRPr lang="en-US" sz="900" kern="1200" dirty="0">
-              <a:solidFill>
-                <a:schemeClr val="tx1"/>
-              </a:solidFill>
-              <a:effectLst/>
-              <a:latin typeface="Segoe UI Light" pitchFamily="34" charset="0"/>
-              <a:ea typeface="+mn-ea"/>
-              <a:cs typeface="+mn-cs"/>
-            </a:endParaRPr>
+            <a:endParaRPr lang="en-US" dirty="0"/>
           </a:p>
         </p:txBody>
       </p:sp>
       <p:sp>
         <p:nvSpPr>
-          <p:cNvPr id="4" name="Footer Placeholder 3"/>
+          <p:cNvPr id="4" name="Header Placeholder 3"/>
           <p:cNvSpPr>
             <a:spLocks noGrp="1"/>
           </p:cNvSpPr>
           <p:nvPr>
-            <p:ph type="ftr" sz="quarter" idx="10"/>
+            <p:ph type="hdr" sz="quarter" idx="10"/>
           </p:nvPr>
         </p:nvSpPr>
         <p:spPr/>
@@ -2009,9 +1854,32 @@
           <a:bodyPr/>
           <a:lstStyle/>
           <a:p>
+            <a:r>
+              <a:rPr lang="en-US"/>
+              <a:t>Microsoft Build 2016</a:t>
+            </a:r>
+            <a:endParaRPr lang="en-US" dirty="0"/>
+          </a:p>
+        </p:txBody>
+      </p:sp>
+      <p:sp>
+        <p:nvSpPr>
+          <p:cNvPr id="5" name="Footer Placeholder 4"/>
+          <p:cNvSpPr>
+            <a:spLocks noGrp="1"/>
+          </p:cNvSpPr>
+          <p:nvPr>
+            <p:ph type="ftr" sz="quarter" idx="11"/>
+          </p:nvPr>
+        </p:nvSpPr>
+        <p:spPr/>
+        <p:txBody>
+          <a:bodyPr/>
+          <a:lstStyle/>
+          <a:p>
             <a:pPr defTabSz="914099" eaLnBrk="0" hangingPunct="0"/>
             <a:r>
-              <a:rPr lang="en-US" sz="400" dirty="0">
+              <a:rPr lang="en-US" sz="400">
                 <a:gradFill>
                   <a:gsLst>
                     <a:gs pos="0">
@@ -2027,19 +1895,35 @@
                 <a:ea typeface="Segoe UI" pitchFamily="34" charset="0"/>
                 <a:cs typeface="Segoe UI" pitchFamily="34" charset="0"/>
               </a:rPr>
-              <a:t>© 2016 Microsoft Corporation. All rights reserved. Microsoft, Windows, and other product names are or may be registered trademarks and/or trademarks in the U.S. and/or other countries. The information herein is for informational purposes only and represents the current view of Microsoft Corporation as of the date of this presentation.  Because Microsoft must respond to changing market conditions, it should not be interpreted to be a commitment on the part of Microsoft, and Microsoft cannot guarantee the accuracy of any information provided after the date of this presentation.  MICROSOFT MAKES NO WARRANTIES, EXPRESS, IMPLIED OR STATUTORY, AS TO THE INFORMATION IN THIS PRESENTATION.</a:t>
-            </a:r>
+              <a:t>© 2016 Microsoft Corporation. All rights reserved. MICROSOFT MAKES NO WARRANTIES, EXPRESS, IMPLIED OR STATUTORY, AS TO THE INFORMATION IN THIS PRESENTATION.</a:t>
+            </a:r>
+            <a:endParaRPr lang="en-US" sz="400" dirty="0">
+              <a:gradFill>
+                <a:gsLst>
+                  <a:gs pos="0">
+                    <a:prstClr val="black"/>
+                  </a:gs>
+                  <a:gs pos="100000">
+                    <a:prstClr val="black"/>
+                  </a:gs>
+                </a:gsLst>
+                <a:lin ang="5400000" scaled="0"/>
+              </a:gradFill>
+              <a:latin typeface="Segoe UI" pitchFamily="34" charset="0"/>
+              <a:ea typeface="Segoe UI" pitchFamily="34" charset="0"/>
+              <a:cs typeface="Segoe UI" pitchFamily="34" charset="0"/>
+            </a:endParaRPr>
           </a:p>
         </p:txBody>
       </p:sp>
       <p:sp>
         <p:nvSpPr>
-          <p:cNvPr id="5" name="Date Placeholder 4"/>
+          <p:cNvPr id="6" name="Date Placeholder 5"/>
           <p:cNvSpPr>
             <a:spLocks noGrp="1"/>
           </p:cNvSpPr>
           <p:nvPr>
-            <p:ph type="dt" idx="11"/>
+            <p:ph type="dt" idx="12"/>
           </p:nvPr>
         </p:nvSpPr>
         <p:spPr/>
@@ -2047,9 +1931,9 @@
           <a:bodyPr/>
           <a:lstStyle/>
           <a:p>
-            <a:fld id="{E74353ED-ACB2-44BF-A903-985B0AF962B7}" type="datetime1">
+            <a:fld id="{38EEC551-8CDA-4EB6-89BB-2A86C9F091C8}" type="datetime8">
               <a:rPr lang="en-US" smtClean="0"/>
-              <a:t>3/28/2016</a:t>
+              <a:t>3/28/2016 2:33 PM</a:t>
             </a:fld>
             <a:endParaRPr lang="en-US" dirty="0"/>
           </a:p>
@@ -2057,12 +1941,12 @@
       </p:sp>
       <p:sp>
         <p:nvSpPr>
-          <p:cNvPr id="6" name="Slide Number Placeholder 5"/>
+          <p:cNvPr id="7" name="Slide Number Placeholder 6"/>
           <p:cNvSpPr>
             <a:spLocks noGrp="1"/>
           </p:cNvSpPr>
           <p:nvPr>
-            <p:ph type="sldNum" sz="quarter" idx="12"/>
+            <p:ph type="sldNum" sz="quarter" idx="13"/>
           </p:nvPr>
         </p:nvSpPr>
         <p:spPr/>
@@ -2082,7 +1966,7 @@
     </p:spTree>
     <p:extLst>
       <p:ext uri="{BB962C8B-B14F-4D97-AF65-F5344CB8AC3E}">
-        <p14:creationId xmlns:p14="http://schemas.microsoft.com/office/powerpoint/2010/main" val="1327386520"/>
+        <p14:creationId xmlns:p14="http://schemas.microsoft.com/office/powerpoint/2010/main" val="1829344038"/>
       </p:ext>
     </p:extLst>
   </p:cSld>
@@ -2136,18 +2020,160 @@
           <a:bodyPr/>
           <a:lstStyle/>
           <a:p>
-            <a:endParaRPr lang="en-US" dirty="0"/>
-          </a:p>
-          <a:p>
-            <a:r>
-              <a:rPr lang="en-US" dirty="0"/>
-              <a:t>Update phone image</a:t>
-            </a:r>
-            <a:r>
-              <a:rPr lang="en-US" baseline="0" dirty="0"/>
-              <a:t> to a Microsoft phone.</a:t>
-            </a:r>
-            <a:endParaRPr lang="en-US" dirty="0"/>
+            <a:r>
+              <a:rPr lang="en-US" sz="900" b="1" dirty="0"/>
+              <a:t>Share Your Story for Challenge Points Speaker Notes:</a:t>
+            </a:r>
+          </a:p>
+          <a:p>
+            <a:endParaRPr lang="en-US" sz="900" kern="1200" dirty="0">
+              <a:solidFill>
+                <a:schemeClr val="tx1"/>
+              </a:solidFill>
+              <a:effectLst/>
+              <a:latin typeface="Segoe UI Light" pitchFamily="34" charset="0"/>
+              <a:ea typeface="+mn-ea"/>
+              <a:cs typeface="+mn-cs"/>
+            </a:endParaRPr>
+          </a:p>
+          <a:p>
+            <a:r>
+              <a:rPr lang="en-US" sz="900" kern="1200" dirty="0">
+                <a:solidFill>
+                  <a:schemeClr val="tx1"/>
+                </a:solidFill>
+                <a:effectLst/>
+                <a:latin typeface="Segoe UI Light" pitchFamily="34" charset="0"/>
+                <a:ea typeface="+mn-ea"/>
+                <a:cs typeface="+mn-cs"/>
+              </a:rPr>
+              <a:t>Given that the next speaker will typically need access to your room right after your talk we recommend you encourage everyone to form up around the flash voting sign for the 3 minute feedback activity, and to then stick around to chat with you right after.  This approach will benefit participants who want to speak with you after the talk but who are also interested in participating in the feedback activity.  </a:t>
+            </a:r>
+          </a:p>
+          <a:p>
+            <a:r>
+              <a:rPr lang="en-US" sz="900" kern="1200" dirty="0">
+                <a:solidFill>
+                  <a:schemeClr val="tx1"/>
+                </a:solidFill>
+                <a:effectLst/>
+                <a:latin typeface="Segoe UI Light" pitchFamily="34" charset="0"/>
+                <a:ea typeface="+mn-ea"/>
+                <a:cs typeface="+mn-cs"/>
+              </a:rPr>
+              <a:t> </a:t>
+            </a:r>
+          </a:p>
+          <a:p>
+            <a:r>
+              <a:rPr lang="en-US" sz="900" kern="1200" dirty="0">
+                <a:solidFill>
+                  <a:schemeClr val="tx1"/>
+                </a:solidFill>
+                <a:effectLst/>
+                <a:latin typeface="Segoe UI Light" pitchFamily="34" charset="0"/>
+                <a:ea typeface="+mn-ea"/>
+                <a:cs typeface="+mn-cs"/>
+              </a:rPr>
+              <a:t>Emphasize that the attendees who participate in flash voting about their work, in depth feedback sessions, or registering for</a:t>
+            </a:r>
+            <a:r>
+              <a:rPr lang="en-US" sz="900" kern="1200" baseline="0" dirty="0">
+                <a:solidFill>
+                  <a:schemeClr val="tx1"/>
+                </a:solidFill>
+                <a:effectLst/>
+                <a:latin typeface="Segoe UI Light" pitchFamily="34" charset="0"/>
+                <a:ea typeface="+mn-ea"/>
+                <a:cs typeface="+mn-cs"/>
+              </a:rPr>
+              <a:t> future opportunities </a:t>
+            </a:r>
+            <a:r>
+              <a:rPr lang="en-US" sz="900" kern="1200" dirty="0">
+                <a:solidFill>
+                  <a:schemeClr val="tx1"/>
+                </a:solidFill>
+                <a:effectLst/>
+                <a:latin typeface="Segoe UI Light" pitchFamily="34" charset="0"/>
+                <a:ea typeface="+mn-ea"/>
+                <a:cs typeface="+mn-cs"/>
+              </a:rPr>
+              <a:t>will get //build Challenge</a:t>
+            </a:r>
+            <a:r>
+              <a:rPr lang="en-US" sz="900" kern="1200" baseline="0" dirty="0">
+                <a:solidFill>
+                  <a:schemeClr val="tx1"/>
+                </a:solidFill>
+                <a:effectLst/>
+                <a:latin typeface="Segoe UI Light" pitchFamily="34" charset="0"/>
+                <a:ea typeface="+mn-ea"/>
+                <a:cs typeface="+mn-cs"/>
+              </a:rPr>
+              <a:t> P</a:t>
+            </a:r>
+            <a:r>
+              <a:rPr lang="en-US" sz="900" kern="1200" dirty="0">
+                <a:solidFill>
+                  <a:schemeClr val="tx1"/>
+                </a:solidFill>
+                <a:effectLst/>
+                <a:latin typeface="Segoe UI Light" pitchFamily="34" charset="0"/>
+                <a:ea typeface="+mn-ea"/>
+                <a:cs typeface="+mn-cs"/>
+              </a:rPr>
+              <a:t>oints for doing these activities.  Encourage them to swing by </a:t>
+            </a:r>
+            <a:r>
+              <a:rPr lang="en-US" sz="900" strike="noStrike" kern="1200" dirty="0">
+                <a:solidFill>
+                  <a:schemeClr val="tx1"/>
+                </a:solidFill>
+                <a:effectLst/>
+                <a:latin typeface="Segoe UI Light" pitchFamily="34" charset="0"/>
+                <a:ea typeface="+mn-ea"/>
+                <a:cs typeface="+mn-cs"/>
+              </a:rPr>
+              <a:t>the </a:t>
+            </a:r>
+            <a:r>
+              <a:rPr lang="en-US" sz="900" strike="noStrike" dirty="0">
+                <a:cs typeface="Segoe UI Semibold" panose="020B0702040204020203" pitchFamily="34" charset="0"/>
+              </a:rPr>
+              <a:t>Visual Studio: Share Your Story </a:t>
+            </a:r>
+            <a:r>
+              <a:rPr lang="en-US" sz="900" strike="noStrike" dirty="0"/>
+              <a:t>booth to get more</a:t>
+            </a:r>
+            <a:r>
+              <a:rPr lang="en-US" sz="900" strike="noStrike" baseline="0" dirty="0"/>
+              <a:t> details about additional Challenge Point opportunities</a:t>
+            </a:r>
+            <a:r>
+              <a:rPr lang="en-US" sz="900" kern="1200" dirty="0">
+                <a:solidFill>
+                  <a:schemeClr val="tx1"/>
+                </a:solidFill>
+                <a:effectLst/>
+                <a:latin typeface="Segoe UI Light" pitchFamily="34" charset="0"/>
+                <a:ea typeface="+mn-ea"/>
+                <a:cs typeface="+mn-cs"/>
+              </a:rPr>
+              <a:t>.  </a:t>
+            </a:r>
+          </a:p>
+          <a:p>
+            <a:endParaRPr lang="en-US" sz="900" kern="1200" dirty="0">
+              <a:solidFill>
+                <a:schemeClr val="tx1"/>
+              </a:solidFill>
+              <a:effectLst/>
+              <a:latin typeface="Segoe UI Light" pitchFamily="34" charset="0"/>
+              <a:ea typeface="+mn-ea"/>
+              <a:cs typeface="+mn-cs"/>
+            </a:endParaRPr>
           </a:p>
         </p:txBody>
       </p:sp>
@@ -2239,6 +2265,163 @@
     </p:spTree>
     <p:extLst>
       <p:ext uri="{BB962C8B-B14F-4D97-AF65-F5344CB8AC3E}">
+        <p14:creationId xmlns:p14="http://schemas.microsoft.com/office/powerpoint/2010/main" val="1327386520"/>
+      </p:ext>
+    </p:extLst>
+  </p:cSld>
+  <p:clrMapOvr>
+    <a:masterClrMapping/>
+  </p:clrMapOvr>
+</p:notes>
+</file>
+
+<file path=ppt/notesSlides/notesSlide16.xml><?xml version="1.0" encoding="utf-8"?>
+<p:notes xmlns:a="http://schemas.openxmlformats.org/drawingml/2006/main" xmlns:r="http://schemas.openxmlformats.org/officeDocument/2006/relationships" xmlns:p="http://schemas.openxmlformats.org/presentationml/2006/main">
+  <p:cSld>
+    <p:spTree>
+      <p:nvGrpSpPr>
+        <p:cNvPr id="1" name=""/>
+        <p:cNvGrpSpPr/>
+        <p:nvPr/>
+      </p:nvGrpSpPr>
+      <p:grpSpPr>
+        <a:xfrm>
+          <a:off x="0" y="0"/>
+          <a:ext cx="0" cy="0"/>
+          <a:chOff x="0" y="0"/>
+          <a:chExt cx="0" cy="0"/>
+        </a:xfrm>
+      </p:grpSpPr>
+      <p:sp>
+        <p:nvSpPr>
+          <p:cNvPr id="2" name="Slide Image Placeholder 1"/>
+          <p:cNvSpPr>
+            <a:spLocks noGrp="1" noRot="1" noChangeAspect="1"/>
+          </p:cNvSpPr>
+          <p:nvPr>
+            <p:ph type="sldImg"/>
+          </p:nvPr>
+        </p:nvSpPr>
+        <p:spPr/>
+      </p:sp>
+      <p:sp>
+        <p:nvSpPr>
+          <p:cNvPr id="3" name="Notes Placeholder 2"/>
+          <p:cNvSpPr>
+            <a:spLocks noGrp="1"/>
+          </p:cNvSpPr>
+          <p:nvPr>
+            <p:ph type="body" idx="1"/>
+          </p:nvPr>
+        </p:nvSpPr>
+        <p:spPr/>
+        <p:txBody>
+          <a:bodyPr/>
+          <a:lstStyle/>
+          <a:p>
+            <a:endParaRPr lang="en-US" dirty="0"/>
+          </a:p>
+          <a:p>
+            <a:r>
+              <a:rPr lang="en-US" dirty="0"/>
+              <a:t>Update phone image</a:t>
+            </a:r>
+            <a:r>
+              <a:rPr lang="en-US" baseline="0" dirty="0"/>
+              <a:t> to a Microsoft phone.</a:t>
+            </a:r>
+            <a:endParaRPr lang="en-US" dirty="0"/>
+          </a:p>
+        </p:txBody>
+      </p:sp>
+      <p:sp>
+        <p:nvSpPr>
+          <p:cNvPr id="4" name="Footer Placeholder 3"/>
+          <p:cNvSpPr>
+            <a:spLocks noGrp="1"/>
+          </p:cNvSpPr>
+          <p:nvPr>
+            <p:ph type="ftr" sz="quarter" idx="10"/>
+          </p:nvPr>
+        </p:nvSpPr>
+        <p:spPr/>
+        <p:txBody>
+          <a:bodyPr/>
+          <a:lstStyle/>
+          <a:p>
+            <a:pPr defTabSz="914099" eaLnBrk="0" hangingPunct="0"/>
+            <a:r>
+              <a:rPr lang="en-US" sz="400" dirty="0">
+                <a:gradFill>
+                  <a:gsLst>
+                    <a:gs pos="0">
+                      <a:prstClr val="black"/>
+                    </a:gs>
+                    <a:gs pos="100000">
+                      <a:prstClr val="black"/>
+                    </a:gs>
+                  </a:gsLst>
+                  <a:lin ang="5400000" scaled="0"/>
+                </a:gradFill>
+                <a:latin typeface="Segoe UI" pitchFamily="34" charset="0"/>
+                <a:ea typeface="Segoe UI" pitchFamily="34" charset="0"/>
+                <a:cs typeface="Segoe UI" pitchFamily="34" charset="0"/>
+              </a:rPr>
+              <a:t>© 2016 Microsoft Corporation. All rights reserved. Microsoft, Windows, and other product names are or may be registered trademarks and/or trademarks in the U.S. and/or other countries. The information herein is for informational purposes only and represents the current view of Microsoft Corporation as of the date of this presentation.  Because Microsoft must respond to changing market conditions, it should not be interpreted to be a commitment on the part of Microsoft, and Microsoft cannot guarantee the accuracy of any information provided after the date of this presentation.  MICROSOFT MAKES NO WARRANTIES, EXPRESS, IMPLIED OR STATUTORY, AS TO THE INFORMATION IN THIS PRESENTATION.</a:t>
+            </a:r>
+          </a:p>
+        </p:txBody>
+      </p:sp>
+      <p:sp>
+        <p:nvSpPr>
+          <p:cNvPr id="5" name="Date Placeholder 4"/>
+          <p:cNvSpPr>
+            <a:spLocks noGrp="1"/>
+          </p:cNvSpPr>
+          <p:nvPr>
+            <p:ph type="dt" idx="11"/>
+          </p:nvPr>
+        </p:nvSpPr>
+        <p:spPr/>
+        <p:txBody>
+          <a:bodyPr/>
+          <a:lstStyle/>
+          <a:p>
+            <a:fld id="{E74353ED-ACB2-44BF-A903-985B0AF962B7}" type="datetime1">
+              <a:rPr lang="en-US" smtClean="0"/>
+              <a:t>3/28/2016</a:t>
+            </a:fld>
+            <a:endParaRPr lang="en-US" dirty="0"/>
+          </a:p>
+        </p:txBody>
+      </p:sp>
+      <p:sp>
+        <p:nvSpPr>
+          <p:cNvPr id="6" name="Slide Number Placeholder 5"/>
+          <p:cNvSpPr>
+            <a:spLocks noGrp="1"/>
+          </p:cNvSpPr>
+          <p:nvPr>
+            <p:ph type="sldNum" sz="quarter" idx="12"/>
+          </p:nvPr>
+        </p:nvSpPr>
+        <p:spPr/>
+        <p:txBody>
+          <a:bodyPr/>
+          <a:lstStyle/>
+          <a:p>
+            <a:fld id="{B4008EB6-D09E-4580-8CD6-DDB14511944F}" type="slidenum">
+              <a:rPr lang="en-US" smtClean="0"/>
+              <a:pPr/>
+              <a:t>18</a:t>
+            </a:fld>
+            <a:endParaRPr lang="en-US" dirty="0"/>
+          </a:p>
+        </p:txBody>
+      </p:sp>
+    </p:spTree>
+    <p:extLst>
+      <p:ext uri="{BB962C8B-B14F-4D97-AF65-F5344CB8AC3E}">
         <p14:creationId xmlns:p14="http://schemas.microsoft.com/office/powerpoint/2010/main" val="1355178663"/>
       </p:ext>
     </p:extLst>
@@ -2249,7 +2432,7 @@
 </p:notes>
 </file>
 
-<file path=ppt/notesSlides/notesSlide16.xml><?xml version="1.0" encoding="utf-8"?>
+<file path=ppt/notesSlides/notesSlide17.xml><?xml version="1.0" encoding="utf-8"?>
 <p:notes xmlns:a="http://schemas.openxmlformats.org/drawingml/2006/main" xmlns:r="http://schemas.openxmlformats.org/officeDocument/2006/relationships" xmlns:p="http://schemas.openxmlformats.org/presentationml/2006/main">
   <p:cSld>
     <p:spTree>
@@ -2356,7 +2539,7 @@
                   <a:prstClr val="black"/>
                 </a:solidFill>
               </a:rPr>
-              <a:t>3/28/2016 12:28 PM</a:t>
+              <a:t>3/28/2016 1:32 PM</a:t>
             </a:fld>
             <a:endParaRPr lang="en-US" dirty="0">
               <a:solidFill>
@@ -2388,7 +2571,7 @@
                 </a:solidFill>
               </a:rPr>
               <a:pPr/>
-              <a:t>18</a:t>
+              <a:t>19</a:t>
             </a:fld>
             <a:endParaRPr lang="en-US" dirty="0">
               <a:solidFill>
@@ -2591,7 +2774,7 @@
           <a:p>
             <a:fld id="{38EEC551-8CDA-4EB6-89BB-2A86C9F091C8}" type="datetime8">
               <a:rPr lang="en-US" smtClean="0"/>
-              <a:t>3/28/2016 12:28 PM</a:t>
+              <a:t>3/28/2016 1:32 PM</a:t>
             </a:fld>
             <a:endParaRPr lang="en-US" dirty="0"/>
           </a:p>
@@ -4560,7 +4743,7 @@
           <a:p>
             <a:fld id="{38EEC551-8CDA-4EB6-89BB-2A86C9F091C8}" type="datetime8">
               <a:rPr lang="en-US" smtClean="0"/>
-              <a:t>3/28/2016 12:28 PM</a:t>
+              <a:t>3/28/2016 1:32 PM</a:t>
             </a:fld>
             <a:endParaRPr lang="en-US" dirty="0"/>
           </a:p>
@@ -4741,7 +4924,7 @@
           <a:p>
             <a:fld id="{38EEC551-8CDA-4EB6-89BB-2A86C9F091C8}" type="datetime8">
               <a:rPr lang="en-US" smtClean="0"/>
-              <a:t>3/28/2016 1:22 PM</a:t>
+              <a:t>3/28/2016 1:32 PM</a:t>
             </a:fld>
             <a:endParaRPr lang="en-US" dirty="0"/>
           </a:p>
@@ -24068,13 +24251,13 @@
   <p:clrMapOvr>
     <a:masterClrMapping/>
   </p:clrMapOvr>
-  <mc:AlternateContent xmlns:mc="http://schemas.openxmlformats.org/markup-compatibility/2006">
-    <mc:Choice xmlns:p14="http://schemas.microsoft.com/office/powerpoint/2010/main" Requires="p14">
+  <mc:AlternateContent xmlns:mc="http://schemas.openxmlformats.org/markup-compatibility/2006" xmlns:p14="http://schemas.microsoft.com/office/powerpoint/2010/main">
+    <mc:Choice Requires="p14">
       <p:transition spd="slow" p14:dur="3400">
         <p14:reveal/>
       </p:transition>
     </mc:Choice>
-    <mc:Fallback>
+    <mc:Fallback xmlns="">
       <p:transition spd="slow">
         <p:fade/>
       </p:transition>
@@ -25310,7 +25493,7 @@
 </file>
 
 <file path=ppt/slides/slide13.xml><?xml version="1.0" encoding="utf-8"?>
-<p:sld xmlns:a="http://schemas.openxmlformats.org/drawingml/2006/main" xmlns:r="http://schemas.openxmlformats.org/officeDocument/2006/relationships" xmlns:p="http://schemas.openxmlformats.org/presentationml/2006/main" show="0">
+<p:sld xmlns:a="http://schemas.openxmlformats.org/drawingml/2006/main" xmlns:r="http://schemas.openxmlformats.org/officeDocument/2006/relationships" xmlns:p="http://schemas.openxmlformats.org/presentationml/2006/main">
   <p:cSld>
     <p:spTree>
       <p:nvGrpSpPr>
@@ -25328,61 +25511,63 @@
       </p:grpSpPr>
       <p:sp>
         <p:nvSpPr>
-          <p:cNvPr id="71" name="Rectangle 70"/>
+          <p:cNvPr id="3" name="Rectangle 2"/>
           <p:cNvSpPr/>
           <p:nvPr/>
         </p:nvSpPr>
         <p:spPr bwMode="auto">
           <a:xfrm>
-            <a:off x="882" y="1547274"/>
-            <a:ext cx="5531555" cy="5298882"/>
+            <a:off x="1" y="325436"/>
+            <a:ext cx="274637" cy="756438"/>
           </a:xfrm>
           <a:prstGeom prst="rect">
             <a:avLst/>
           </a:prstGeom>
           <a:solidFill>
-            <a:schemeClr val="bg1"/>
+            <a:schemeClr val="accent3"/>
           </a:solidFill>
           <a:ln>
             <a:noFill/>
             <a:headEnd type="none" w="med" len="med"/>
             <a:tailEnd type="none" w="med" len="med"/>
           </a:ln>
+          <a:effectLst/>
         </p:spPr>
         <p:style>
-          <a:lnRef idx="2">
-            <a:schemeClr val="accent1">
-              <a:shade val="50000"/>
-            </a:schemeClr>
+          <a:lnRef idx="1">
+            <a:schemeClr val="accent2"/>
           </a:lnRef>
-          <a:fillRef idx="1">
-            <a:schemeClr val="accent1"/>
+          <a:fillRef idx="3">
+            <a:schemeClr val="accent2"/>
           </a:fillRef>
-          <a:effectRef idx="0">
-            <a:schemeClr val="accent1"/>
+          <a:effectRef idx="2">
+            <a:schemeClr val="accent2"/>
           </a:effectRef>
           <a:fontRef idx="minor">
             <a:schemeClr val="lt1"/>
           </a:fontRef>
         </p:style>
         <p:txBody>
-          <a:bodyPr vert="horz" wrap="square" lIns="0" tIns="47565" rIns="0" bIns="47565" numCol="1" rtlCol="0" anchor="ctr" anchorCtr="0" compatLnSpc="1">
+          <a:bodyPr rot="0" spcFirstLastPara="0" vertOverflow="overflow" horzOverflow="overflow" vert="horz" wrap="square" lIns="182880" tIns="146304" rIns="182880" bIns="146304" numCol="1" spcCol="0" rtlCol="0" fromWordArt="0" anchor="t" anchorCtr="0" forceAA="0" compatLnSpc="1">
             <a:prstTxWarp prst="textNoShape">
               <a:avLst/>
             </a:prstTxWarp>
+            <a:noAutofit/>
           </a:bodyPr>
           <a:lstStyle/>
           <a:p>
-            <a:pPr algn="ctr" defTabSz="951028" fontAlgn="base">
+            <a:pPr algn="ctr" defTabSz="932472" fontAlgn="base">
+              <a:lnSpc>
+                <a:spcPct val="90000"/>
+              </a:lnSpc>
               <a:spcBef>
                 <a:spcPct val="0"/>
               </a:spcBef>
               <a:spcAft>
                 <a:spcPct val="0"/>
               </a:spcAft>
-              <a:defRPr/>
             </a:pPr>
-            <a:endParaRPr lang="en-US" sz="2040" dirty="0">
+            <a:endParaRPr lang="en-US" sz="2400" dirty="0" err="1">
               <a:gradFill>
                 <a:gsLst>
                   <a:gs pos="0">
@@ -25394,14 +25579,134 @@
                 </a:gsLst>
                 <a:lin ang="5400000" scaled="0"/>
               </a:gradFill>
-              <a:latin typeface="Segoe UI"/>
+              <a:ea typeface="Segoe UI" pitchFamily="34" charset="0"/>
+              <a:cs typeface="Segoe UI" pitchFamily="34" charset="0"/>
             </a:endParaRPr>
           </a:p>
         </p:txBody>
       </p:sp>
       <p:sp>
         <p:nvSpPr>
-          <p:cNvPr id="2" name="Title 1"/>
+          <p:cNvPr id="2" name="Text Placeholder 1"/>
+          <p:cNvSpPr>
+            <a:spLocks noGrp="1"/>
+          </p:cNvSpPr>
+          <p:nvPr>
+            <p:ph type="body" sz="quarter" idx="10"/>
+          </p:nvPr>
+        </p:nvSpPr>
+        <p:spPr>
+          <a:xfrm>
+            <a:off x="274638" y="1289050"/>
+            <a:ext cx="11887200" cy="4235134"/>
+          </a:xfrm>
+        </p:spPr>
+        <p:txBody>
+          <a:bodyPr/>
+          <a:lstStyle/>
+          <a:p>
+            <a:pPr>
+              <a:lnSpc>
+                <a:spcPts val="4600"/>
+              </a:lnSpc>
+            </a:pPr>
+            <a:r>
+              <a:rPr lang="en-US" sz="3600" dirty="0"/>
+              <a:t>Signed up for a </a:t>
+            </a:r>
+            <a:r>
+              <a:rPr lang="en-US" sz="3600" dirty="0" err="1"/>
+              <a:t>Xamarin</a:t>
+            </a:r>
+            <a:r>
+              <a:rPr lang="en-US" sz="3600" dirty="0"/>
+              <a:t> Account</a:t>
+            </a:r>
+          </a:p>
+          <a:p>
+            <a:pPr>
+              <a:lnSpc>
+                <a:spcPts val="4600"/>
+              </a:lnSpc>
+            </a:pPr>
+            <a:r>
+              <a:rPr lang="en-US" sz="3600" dirty="0"/>
+              <a:t>Explored </a:t>
+            </a:r>
+            <a:r>
+              <a:rPr lang="en-US" sz="3600" dirty="0" err="1"/>
+              <a:t>Xamarin</a:t>
+            </a:r>
+            <a:r>
+              <a:rPr lang="en-US" sz="3600" dirty="0"/>
+              <a:t> Projects in Visual Studio</a:t>
+            </a:r>
+          </a:p>
+          <a:p>
+            <a:pPr>
+              <a:lnSpc>
+                <a:spcPts val="4600"/>
+              </a:lnSpc>
+            </a:pPr>
+            <a:r>
+              <a:rPr lang="en-US" sz="3600" dirty="0"/>
+              <a:t>Opened the </a:t>
+            </a:r>
+            <a:r>
+              <a:rPr lang="en-US" sz="3600" dirty="0" err="1"/>
+              <a:t>HealthClinic.Biz</a:t>
+            </a:r>
+            <a:r>
+              <a:rPr lang="en-US" sz="3600" dirty="0"/>
+              <a:t> </a:t>
+            </a:r>
+            <a:r>
+              <a:rPr lang="en-US" sz="3600" dirty="0" err="1"/>
+              <a:t>Xamarin</a:t>
+            </a:r>
+            <a:r>
+              <a:rPr lang="en-US" sz="3600" dirty="0"/>
+              <a:t> Solution</a:t>
+            </a:r>
+          </a:p>
+          <a:p>
+            <a:pPr>
+              <a:lnSpc>
+                <a:spcPts val="4600"/>
+              </a:lnSpc>
+            </a:pPr>
+            <a:r>
+              <a:rPr lang="en-US" sz="3600" dirty="0"/>
+              <a:t>Created a VSTS Team Project</a:t>
+            </a:r>
+          </a:p>
+          <a:p>
+            <a:pPr>
+              <a:lnSpc>
+                <a:spcPts val="4600"/>
+              </a:lnSpc>
+            </a:pPr>
+            <a:r>
+              <a:rPr lang="en-US" sz="3600" dirty="0"/>
+              <a:t>Pushed the Source Code to the VSTS Team Project</a:t>
+            </a:r>
+          </a:p>
+          <a:p>
+            <a:pPr>
+              <a:lnSpc>
+                <a:spcPts val="4600"/>
+              </a:lnSpc>
+            </a:pPr>
+            <a:r>
+              <a:rPr lang="en-US" sz="3600" dirty="0"/>
+              <a:t>Run and understood Unit Tests</a:t>
+            </a:r>
+          </a:p>
+        </p:txBody>
+      </p:sp>
+      <p:sp>
+        <p:nvSpPr>
+          <p:cNvPr id="4" name="Title 3"/>
           <p:cNvSpPr>
             <a:spLocks noGrp="1"/>
           </p:cNvSpPr>
@@ -25409,71 +25714,158 @@
             <p:ph type="title"/>
           </p:nvPr>
         </p:nvSpPr>
-        <p:spPr>
-          <a:xfrm>
-            <a:off x="274639" y="1241426"/>
-            <a:ext cx="5486399" cy="1098762"/>
-          </a:xfrm>
-        </p:spPr>
+        <p:spPr/>
         <p:txBody>
           <a:bodyPr/>
           <a:lstStyle/>
           <a:p>
             <a:r>
               <a:rPr lang="en-US" dirty="0"/>
-              <a:t>Checkpoint</a:t>
+              <a:t>Wrap Up</a:t>
             </a:r>
           </a:p>
         </p:txBody>
       </p:sp>
-      <p:pic>
-        <p:nvPicPr>
-          <p:cNvPr id="8" name="Picture 7"/>
-          <p:cNvPicPr>
-            <a:picLocks noChangeAspect="1"/>
-          </p:cNvPicPr>
-          <p:nvPr/>
-        </p:nvPicPr>
-        <p:blipFill>
-          <a:blip r:embed="rId3">
-            <a:extLst>
-              <a:ext uri="{28A0092B-C50C-407E-A947-70E740481C1C}">
-                <a14:useLocalDpi xmlns:a14="http://schemas.microsoft.com/office/drawing/2010/main" val="0"/>
-              </a:ext>
-            </a:extLst>
-          </a:blip>
-          <a:stretch>
-            <a:fillRect/>
-          </a:stretch>
-        </p:blipFill>
-        <p:spPr>
-          <a:xfrm>
-            <a:off x="5532437" y="0"/>
-            <a:ext cx="6994525" cy="6994525"/>
-          </a:xfrm>
-          <a:prstGeom prst="rect">
-            <a:avLst/>
-          </a:prstGeom>
-        </p:spPr>
-      </p:pic>
     </p:spTree>
     <p:extLst>
       <p:ext uri="{BB962C8B-B14F-4D97-AF65-F5344CB8AC3E}">
-        <p14:creationId xmlns:p14="http://schemas.microsoft.com/office/powerpoint/2010/main" val="1507132331"/>
+        <p14:creationId xmlns:p14="http://schemas.microsoft.com/office/powerpoint/2010/main" val="2855962883"/>
       </p:ext>
     </p:extLst>
   </p:cSld>
   <p:clrMapOvr>
     <a:masterClrMapping/>
   </p:clrMapOvr>
-  <mc:AlternateContent xmlns:mc="http://schemas.openxmlformats.org/markup-compatibility/2006">
-    <mc:Choice xmlns:p14="http://schemas.microsoft.com/office/powerpoint/2010/main" Requires="p14">
-      <p:transition p14:dur="0"/>
-    </mc:Choice>
-    <mc:Fallback>
-      <p:transition/>
-    </mc:Fallback>
-  </mc:AlternateContent>
+  <p:transition>
+    <p:fade/>
+  </p:transition>
+  <p:timing>
+    <p:tnLst>
+      <p:par>
+        <p:cTn id="1" dur="indefinite" restart="never" nodeType="tmRoot">
+          <p:childTnLst>
+            <p:seq concurrent="1" nextAc="seek">
+              <p:cTn id="2" dur="indefinite" nodeType="mainSeq">
+                <p:childTnLst>
+                  <p:par>
+                    <p:cTn id="3" fill="hold">
+                      <p:stCondLst>
+                        <p:cond delay="indefinite"/>
+                        <p:cond evt="onBegin" delay="0">
+                          <p:tn val="2"/>
+                        </p:cond>
+                      </p:stCondLst>
+                      <p:childTnLst>
+                        <p:par>
+                          <p:cTn id="4" fill="hold">
+                            <p:stCondLst>
+                              <p:cond delay="0"/>
+                            </p:stCondLst>
+                            <p:childTnLst>
+                              <p:par>
+                                <p:cTn id="5" presetID="2" presetClass="entr" presetSubtype="8" fill="hold" grpId="0" nodeType="withEffect">
+                                  <p:stCondLst>
+                                    <p:cond delay="0"/>
+                                  </p:stCondLst>
+                                  <p:childTnLst>
+                                    <p:set>
+                                      <p:cBhvr>
+                                        <p:cTn id="6" dur="1" fill="hold">
+                                          <p:stCondLst>
+                                            <p:cond delay="0"/>
+                                          </p:stCondLst>
+                                        </p:cTn>
+                                        <p:tgtEl>
+                                          <p:spTgt spid="3"/>
+                                        </p:tgtEl>
+                                        <p:attrNameLst>
+                                          <p:attrName>style.visibility</p:attrName>
+                                        </p:attrNameLst>
+                                      </p:cBhvr>
+                                      <p:to>
+                                        <p:strVal val="visible"/>
+                                      </p:to>
+                                    </p:set>
+                                    <p:anim calcmode="lin" valueType="num">
+                                      <p:cBhvr additive="base">
+                                        <p:cTn id="7" dur="500" fill="hold"/>
+                                        <p:tgtEl>
+                                          <p:spTgt spid="3"/>
+                                        </p:tgtEl>
+                                        <p:attrNameLst>
+                                          <p:attrName>ppt_x</p:attrName>
+                                        </p:attrNameLst>
+                                      </p:cBhvr>
+                                      <p:tavLst>
+                                        <p:tav tm="0">
+                                          <p:val>
+                                            <p:strVal val="0-#ppt_w/2"/>
+                                          </p:val>
+                                        </p:tav>
+                                        <p:tav tm="100000">
+                                          <p:val>
+                                            <p:strVal val="#ppt_x"/>
+                                          </p:val>
+                                        </p:tav>
+                                      </p:tavLst>
+                                    </p:anim>
+                                    <p:anim calcmode="lin" valueType="num">
+                                      <p:cBhvr additive="base">
+                                        <p:cTn id="8" dur="500" fill="hold"/>
+                                        <p:tgtEl>
+                                          <p:spTgt spid="3"/>
+                                        </p:tgtEl>
+                                        <p:attrNameLst>
+                                          <p:attrName>ppt_y</p:attrName>
+                                        </p:attrNameLst>
+                                      </p:cBhvr>
+                                      <p:tavLst>
+                                        <p:tav tm="0">
+                                          <p:val>
+                                            <p:strVal val="#ppt_y"/>
+                                          </p:val>
+                                        </p:tav>
+                                        <p:tav tm="100000">
+                                          <p:val>
+                                            <p:strVal val="#ppt_y"/>
+                                          </p:val>
+                                        </p:tav>
+                                      </p:tavLst>
+                                    </p:anim>
+                                  </p:childTnLst>
+                                </p:cTn>
+                              </p:par>
+                            </p:childTnLst>
+                          </p:cTn>
+                        </p:par>
+                      </p:childTnLst>
+                    </p:cTn>
+                  </p:par>
+                </p:childTnLst>
+              </p:cTn>
+              <p:prevCondLst>
+                <p:cond evt="onPrev" delay="0">
+                  <p:tgtEl>
+                    <p:sldTgt/>
+                  </p:tgtEl>
+                </p:cond>
+              </p:prevCondLst>
+              <p:nextCondLst>
+                <p:cond evt="onNext" delay="0">
+                  <p:tgtEl>
+                    <p:sldTgt/>
+                  </p:tgtEl>
+                </p:cond>
+              </p:nextCondLst>
+            </p:seq>
+          </p:childTnLst>
+        </p:cTn>
+      </p:par>
+    </p:tnLst>
+    <p:bldLst>
+      <p:bldP spid="3" grpId="0" animBg="1"/>
+    </p:bldLst>
+  </p:timing>
 </p:sld>
 </file>
 
@@ -25579,6 +25971,174 @@
         </p:nvSpPr>
         <p:spPr>
           <a:xfrm>
+            <a:off x="274639" y="1241426"/>
+            <a:ext cx="5486399" cy="1098762"/>
+          </a:xfrm>
+        </p:spPr>
+        <p:txBody>
+          <a:bodyPr/>
+          <a:lstStyle/>
+          <a:p>
+            <a:r>
+              <a:rPr lang="en-US" dirty="0"/>
+              <a:t>Checkpoint</a:t>
+            </a:r>
+          </a:p>
+        </p:txBody>
+      </p:sp>
+      <p:pic>
+        <p:nvPicPr>
+          <p:cNvPr id="8" name="Picture 7"/>
+          <p:cNvPicPr>
+            <a:picLocks noChangeAspect="1"/>
+          </p:cNvPicPr>
+          <p:nvPr/>
+        </p:nvPicPr>
+        <p:blipFill>
+          <a:blip r:embed="rId3">
+            <a:extLst>
+              <a:ext uri="{28A0092B-C50C-407E-A947-70E740481C1C}">
+                <a14:useLocalDpi xmlns:a14="http://schemas.microsoft.com/office/drawing/2010/main" val="0"/>
+              </a:ext>
+            </a:extLst>
+          </a:blip>
+          <a:stretch>
+            <a:fillRect/>
+          </a:stretch>
+        </p:blipFill>
+        <p:spPr>
+          <a:xfrm>
+            <a:off x="5532437" y="0"/>
+            <a:ext cx="6994525" cy="6994525"/>
+          </a:xfrm>
+          <a:prstGeom prst="rect">
+            <a:avLst/>
+          </a:prstGeom>
+        </p:spPr>
+      </p:pic>
+    </p:spTree>
+    <p:extLst>
+      <p:ext uri="{BB962C8B-B14F-4D97-AF65-F5344CB8AC3E}">
+        <p14:creationId xmlns:p14="http://schemas.microsoft.com/office/powerpoint/2010/main" val="1507132331"/>
+      </p:ext>
+    </p:extLst>
+  </p:cSld>
+  <p:clrMapOvr>
+    <a:masterClrMapping/>
+  </p:clrMapOvr>
+  <mc:AlternateContent xmlns:mc="http://schemas.openxmlformats.org/markup-compatibility/2006" xmlns:p14="http://schemas.microsoft.com/office/powerpoint/2010/main">
+    <mc:Choice Requires="p14">
+      <p:transition p14:dur="0"/>
+    </mc:Choice>
+    <mc:Fallback xmlns="">
+      <p:transition/>
+    </mc:Fallback>
+  </mc:AlternateContent>
+</p:sld>
+</file>
+
+<file path=ppt/slides/slide15.xml><?xml version="1.0" encoding="utf-8"?>
+<p:sld xmlns:a="http://schemas.openxmlformats.org/drawingml/2006/main" xmlns:r="http://schemas.openxmlformats.org/officeDocument/2006/relationships" xmlns:p="http://schemas.openxmlformats.org/presentationml/2006/main" show="0">
+  <p:cSld>
+    <p:spTree>
+      <p:nvGrpSpPr>
+        <p:cNvPr id="1" name=""/>
+        <p:cNvGrpSpPr/>
+        <p:nvPr/>
+      </p:nvGrpSpPr>
+      <p:grpSpPr>
+        <a:xfrm>
+          <a:off x="0" y="0"/>
+          <a:ext cx="0" cy="0"/>
+          <a:chOff x="0" y="0"/>
+          <a:chExt cx="0" cy="0"/>
+        </a:xfrm>
+      </p:grpSpPr>
+      <p:sp>
+        <p:nvSpPr>
+          <p:cNvPr id="71" name="Rectangle 70"/>
+          <p:cNvSpPr/>
+          <p:nvPr/>
+        </p:nvSpPr>
+        <p:spPr bwMode="auto">
+          <a:xfrm>
+            <a:off x="882" y="1547274"/>
+            <a:ext cx="5531555" cy="5298882"/>
+          </a:xfrm>
+          <a:prstGeom prst="rect">
+            <a:avLst/>
+          </a:prstGeom>
+          <a:solidFill>
+            <a:schemeClr val="bg1"/>
+          </a:solidFill>
+          <a:ln>
+            <a:noFill/>
+            <a:headEnd type="none" w="med" len="med"/>
+            <a:tailEnd type="none" w="med" len="med"/>
+          </a:ln>
+        </p:spPr>
+        <p:style>
+          <a:lnRef idx="2">
+            <a:schemeClr val="accent1">
+              <a:shade val="50000"/>
+            </a:schemeClr>
+          </a:lnRef>
+          <a:fillRef idx="1">
+            <a:schemeClr val="accent1"/>
+          </a:fillRef>
+          <a:effectRef idx="0">
+            <a:schemeClr val="accent1"/>
+          </a:effectRef>
+          <a:fontRef idx="minor">
+            <a:schemeClr val="lt1"/>
+          </a:fontRef>
+        </p:style>
+        <p:txBody>
+          <a:bodyPr vert="horz" wrap="square" lIns="0" tIns="47565" rIns="0" bIns="47565" numCol="1" rtlCol="0" anchor="ctr" anchorCtr="0" compatLnSpc="1">
+            <a:prstTxWarp prst="textNoShape">
+              <a:avLst/>
+            </a:prstTxWarp>
+          </a:bodyPr>
+          <a:lstStyle/>
+          <a:p>
+            <a:pPr algn="ctr" defTabSz="951028" fontAlgn="base">
+              <a:spcBef>
+                <a:spcPct val="0"/>
+              </a:spcBef>
+              <a:spcAft>
+                <a:spcPct val="0"/>
+              </a:spcAft>
+              <a:defRPr/>
+            </a:pPr>
+            <a:endParaRPr lang="en-US" sz="2040" dirty="0">
+              <a:gradFill>
+                <a:gsLst>
+                  <a:gs pos="0">
+                    <a:srgbClr val="FFFFFF"/>
+                  </a:gs>
+                  <a:gs pos="100000">
+                    <a:srgbClr val="FFFFFF"/>
+                  </a:gs>
+                </a:gsLst>
+                <a:lin ang="5400000" scaled="0"/>
+              </a:gradFill>
+              <a:latin typeface="Segoe UI"/>
+            </a:endParaRPr>
+          </a:p>
+        </p:txBody>
+      </p:sp>
+      <p:sp>
+        <p:nvSpPr>
+          <p:cNvPr id="2" name="Title 1"/>
+          <p:cNvSpPr>
+            <a:spLocks noGrp="1"/>
+          </p:cNvSpPr>
+          <p:nvPr>
+            <p:ph type="title"/>
+          </p:nvPr>
+        </p:nvSpPr>
+        <p:spPr>
+          <a:xfrm>
             <a:off x="274637" y="1547274"/>
             <a:ext cx="5486399" cy="1098762"/>
           </a:xfrm>
@@ -25634,18 +26194,18 @@
   <p:clrMapOvr>
     <a:masterClrMapping/>
   </p:clrMapOvr>
-  <mc:AlternateContent xmlns:mc="http://schemas.openxmlformats.org/markup-compatibility/2006">
-    <mc:Choice xmlns:p14="http://schemas.microsoft.com/office/powerpoint/2010/main" Requires="p14">
+  <mc:AlternateContent xmlns:mc="http://schemas.openxmlformats.org/markup-compatibility/2006" xmlns:p14="http://schemas.microsoft.com/office/powerpoint/2010/main">
+    <mc:Choice Requires="p14">
       <p:transition p14:dur="0"/>
     </mc:Choice>
-    <mc:Fallback>
+    <mc:Fallback xmlns="">
       <p:transition/>
     </mc:Fallback>
   </mc:AlternateContent>
 </p:sld>
 </file>
 
-<file path=ppt/slides/slide15.xml><?xml version="1.0" encoding="utf-8"?>
+<file path=ppt/slides/slide16.xml><?xml version="1.0" encoding="utf-8"?>
 <p:sld xmlns:a="http://schemas.openxmlformats.org/drawingml/2006/main" xmlns:r="http://schemas.openxmlformats.org/officeDocument/2006/relationships" xmlns:p="http://schemas.openxmlformats.org/presentationml/2006/main">
   <p:cSld>
     <p:spTree>
@@ -25796,6 +26356,82 @@
           </a:p>
         </p:txBody>
       </p:sp>
+      <p:sp>
+        <p:nvSpPr>
+          <p:cNvPr id="4" name="Rectangle 3"/>
+          <p:cNvSpPr/>
+          <p:nvPr/>
+        </p:nvSpPr>
+        <p:spPr bwMode="auto">
+          <a:xfrm>
+            <a:off x="1" y="325436"/>
+            <a:ext cx="274637" cy="756438"/>
+          </a:xfrm>
+          <a:prstGeom prst="rect">
+            <a:avLst/>
+          </a:prstGeom>
+          <a:solidFill>
+            <a:schemeClr val="accent3"/>
+          </a:solidFill>
+          <a:ln>
+            <a:noFill/>
+            <a:headEnd type="none" w="med" len="med"/>
+            <a:tailEnd type="none" w="med" len="med"/>
+          </a:ln>
+          <a:effectLst/>
+        </p:spPr>
+        <p:style>
+          <a:lnRef idx="1">
+            <a:schemeClr val="accent2"/>
+          </a:lnRef>
+          <a:fillRef idx="3">
+            <a:schemeClr val="accent2"/>
+          </a:fillRef>
+          <a:effectRef idx="2">
+            <a:schemeClr val="accent2"/>
+          </a:effectRef>
+          <a:fontRef idx="minor">
+            <a:schemeClr val="lt1"/>
+          </a:fontRef>
+        </p:style>
+        <p:txBody>
+          <a:bodyPr rot="0" spcFirstLastPara="0" vertOverflow="overflow" horzOverflow="overflow" vert="horz" wrap="square" lIns="182880" tIns="146304" rIns="182880" bIns="146304" numCol="1" spcCol="0" rtlCol="0" fromWordArt="0" anchor="t" anchorCtr="0" forceAA="0" compatLnSpc="1">
+            <a:prstTxWarp prst="textNoShape">
+              <a:avLst/>
+            </a:prstTxWarp>
+            <a:noAutofit/>
+          </a:bodyPr>
+          <a:lstStyle/>
+          <a:p>
+            <a:pPr algn="ctr" defTabSz="932472" fontAlgn="base">
+              <a:lnSpc>
+                <a:spcPct val="90000"/>
+              </a:lnSpc>
+              <a:spcBef>
+                <a:spcPct val="0"/>
+              </a:spcBef>
+              <a:spcAft>
+                <a:spcPct val="0"/>
+              </a:spcAft>
+            </a:pPr>
+            <a:endParaRPr lang="en-US" sz="2400" dirty="0" err="1">
+              <a:gradFill>
+                <a:gsLst>
+                  <a:gs pos="0">
+                    <a:srgbClr val="FFFFFF"/>
+                  </a:gs>
+                  <a:gs pos="100000">
+                    <a:srgbClr val="FFFFFF"/>
+                  </a:gs>
+                </a:gsLst>
+                <a:lin ang="5400000" scaled="0"/>
+              </a:gradFill>
+              <a:ea typeface="Segoe UI" pitchFamily="34" charset="0"/>
+              <a:cs typeface="Segoe UI" pitchFamily="34" charset="0"/>
+            </a:endParaRPr>
+          </a:p>
+        </p:txBody>
+      </p:sp>
     </p:spTree>
     <p:extLst>
       <p:ext uri="{BB962C8B-B14F-4D97-AF65-F5344CB8AC3E}">
@@ -25818,10 +26454,137 @@
       </p:transition>
     </mc:Fallback>
   </mc:AlternateContent>
+  <p:timing>
+    <p:tnLst>
+      <p:par>
+        <p:cTn id="1" dur="indefinite" restart="never" nodeType="tmRoot">
+          <p:childTnLst>
+            <p:seq concurrent="1" nextAc="seek">
+              <p:cTn id="2" dur="indefinite" nodeType="mainSeq">
+                <p:childTnLst>
+                  <p:par>
+                    <p:cTn id="3" fill="hold">
+                      <p:stCondLst>
+                        <p:cond delay="indefinite"/>
+                        <p:cond evt="onBegin" delay="0">
+                          <p:tn val="2"/>
+                        </p:cond>
+                      </p:stCondLst>
+                      <p:childTnLst>
+                        <p:par>
+                          <p:cTn id="4" fill="hold">
+                            <p:stCondLst>
+                              <p:cond delay="0"/>
+                            </p:stCondLst>
+                            <p:childTnLst>
+                              <p:par>
+                                <p:cTn id="5" presetID="2" presetClass="entr" presetSubtype="8" fill="hold" grpId="0" nodeType="withEffect">
+                                  <p:stCondLst>
+                                    <p:cond delay="0"/>
+                                  </p:stCondLst>
+                                  <p:childTnLst>
+                                    <p:set>
+                                      <p:cBhvr>
+                                        <p:cTn id="6" dur="1" fill="hold">
+                                          <p:stCondLst>
+                                            <p:cond delay="0"/>
+                                          </p:stCondLst>
+                                        </p:cTn>
+                                        <p:tgtEl>
+                                          <p:spTgt spid="4"/>
+                                        </p:tgtEl>
+                                        <p:attrNameLst>
+                                          <p:attrName>style.visibility</p:attrName>
+                                        </p:attrNameLst>
+                                      </p:cBhvr>
+                                      <p:to>
+                                        <p:strVal val="visible"/>
+                                      </p:to>
+                                    </p:set>
+                                    <p:anim calcmode="lin" valueType="num">
+                                      <p:cBhvr additive="base">
+                                        <p:cTn id="7" dur="500" fill="hold"/>
+                                        <p:tgtEl>
+                                          <p:spTgt spid="4"/>
+                                        </p:tgtEl>
+                                        <p:attrNameLst>
+                                          <p:attrName>ppt_x</p:attrName>
+                                        </p:attrNameLst>
+                                      </p:cBhvr>
+                                      <p:tavLst>
+                                        <p:tav tm="0">
+                                          <p:val>
+                                            <p:strVal val="0-#ppt_w/2"/>
+                                          </p:val>
+                                        </p:tav>
+                                        <p:tav tm="100000">
+                                          <p:val>
+                                            <p:strVal val="#ppt_x"/>
+                                          </p:val>
+                                        </p:tav>
+                                      </p:tavLst>
+                                    </p:anim>
+                                    <p:anim calcmode="lin" valueType="num">
+                                      <p:cBhvr additive="base">
+                                        <p:cTn id="8" dur="500" fill="hold"/>
+                                        <p:tgtEl>
+                                          <p:spTgt spid="4"/>
+                                        </p:tgtEl>
+                                        <p:attrNameLst>
+                                          <p:attrName>ppt_y</p:attrName>
+                                        </p:attrNameLst>
+                                      </p:cBhvr>
+                                      <p:tavLst>
+                                        <p:tav tm="0">
+                                          <p:val>
+                                            <p:strVal val="#ppt_y"/>
+                                          </p:val>
+                                        </p:tav>
+                                        <p:tav tm="100000">
+                                          <p:val>
+                                            <p:strVal val="#ppt_y"/>
+                                          </p:val>
+                                        </p:tav>
+                                      </p:tavLst>
+                                    </p:anim>
+                                  </p:childTnLst>
+                                </p:cTn>
+                              </p:par>
+                            </p:childTnLst>
+                          </p:cTn>
+                        </p:par>
+                      </p:childTnLst>
+                    </p:cTn>
+                  </p:par>
+                </p:childTnLst>
+              </p:cTn>
+              <p:prevCondLst>
+                <p:cond evt="onPrev" delay="0">
+                  <p:tgtEl>
+                    <p:sldTgt/>
+                  </p:tgtEl>
+                </p:cond>
+              </p:prevCondLst>
+              <p:nextCondLst>
+                <p:cond evt="onNext" delay="0">
+                  <p:tgtEl>
+                    <p:sldTgt/>
+                  </p:tgtEl>
+                </p:cond>
+              </p:nextCondLst>
+            </p:seq>
+          </p:childTnLst>
+        </p:cTn>
+      </p:par>
+    </p:tnLst>
+    <p:bldLst>
+      <p:bldP spid="4" grpId="0" animBg="1"/>
+    </p:bldLst>
+  </p:timing>
 </p:sld>
 </file>
 
-<file path=ppt/slides/slide16.xml><?xml version="1.0" encoding="utf-8"?>
+<file path=ppt/slides/slide17.xml><?xml version="1.0" encoding="utf-8"?>
 <p:sld xmlns:a="http://schemas.openxmlformats.org/drawingml/2006/main" xmlns:r="http://schemas.openxmlformats.org/officeDocument/2006/relationships" xmlns:p="http://schemas.openxmlformats.org/presentationml/2006/main">
   <p:cSld>
     <p:spTree>
@@ -26053,7 +26816,7 @@
 </p:sld>
 </file>
 
-<file path=ppt/slides/slide17.xml><?xml version="1.0" encoding="utf-8"?>
+<file path=ppt/slides/slide18.xml><?xml version="1.0" encoding="utf-8"?>
 <p:sld xmlns:a="http://schemas.openxmlformats.org/drawingml/2006/main" xmlns:r="http://schemas.openxmlformats.org/officeDocument/2006/relationships" xmlns:p="http://schemas.openxmlformats.org/presentationml/2006/main">
   <p:cSld>
     <p:spTree>
@@ -26645,7 +27408,7 @@
 </p:sld>
 </file>
 
-<file path=ppt/slides/slide18.xml><?xml version="1.0" encoding="utf-8"?>
+<file path=ppt/slides/slide19.xml><?xml version="1.0" encoding="utf-8"?>
 <p:sld xmlns:a="http://schemas.openxmlformats.org/drawingml/2006/main" xmlns:r="http://schemas.openxmlformats.org/officeDocument/2006/relationships" xmlns:p="http://schemas.openxmlformats.org/presentationml/2006/main">
   <p:cSld>
     <p:spTree>
@@ -36132,7 +36895,7 @@
         </p:nvSpPr>
         <p:spPr>
           <a:xfrm>
-            <a:off x="95066" y="144462"/>
+            <a:off x="95066" y="199070"/>
             <a:ext cx="6043987" cy="1393192"/>
           </a:xfrm>
         </p:spPr>
@@ -36140,12 +36903,13 @@
           <a:bodyPr/>
           <a:lstStyle/>
           <a:p>
-            <a:pPr algn="ctr"/>
             <a:r>
               <a:rPr lang="en-US" sz="4000" dirty="0">
                 <a:solidFill>
                   <a:schemeClr val="tx2"/>
                 </a:solidFill>
+                <a:latin typeface="Segoe UI Semibold" panose="020B0702040204020203" pitchFamily="34" charset="0"/>
+                <a:cs typeface="Segoe UI Semibold" panose="020B0702040204020203" pitchFamily="34" charset="0"/>
               </a:rPr>
               <a:t>C# cross-platform mobile:</a:t>
             </a:r>
@@ -36154,6 +36918,8 @@
                 <a:solidFill>
                   <a:schemeClr val="tx2"/>
                 </a:solidFill>
+                <a:latin typeface="Segoe UI Semibold" panose="020B0702040204020203" pitchFamily="34" charset="0"/>
+                <a:cs typeface="Segoe UI Semibold" panose="020B0702040204020203" pitchFamily="34" charset="0"/>
               </a:rPr>
             </a:br>
             <a:r>
@@ -36161,6 +36927,8 @@
                 <a:solidFill>
                   <a:schemeClr val="tx2"/>
                 </a:solidFill>
+                <a:latin typeface="Segoe UI Semibold" panose="020B0702040204020203" pitchFamily="34" charset="0"/>
+                <a:cs typeface="Segoe UI Semibold" panose="020B0702040204020203" pitchFamily="34" charset="0"/>
               </a:rPr>
               <a:t>.NET + Xamarin</a:t>
             </a:r>
@@ -36175,7 +36943,7 @@
         </p:nvSpPr>
         <p:spPr>
           <a:xfrm>
-            <a:off x="392137" y="1870940"/>
+            <a:off x="392137" y="1744662"/>
             <a:ext cx="5571613" cy="3677930"/>
           </a:xfrm>
           <a:prstGeom prst="rect">
@@ -44426,21 +45194,6 @@
 </file>
 
 <file path=customXml/item1.xml><?xml version="1.0" encoding="utf-8"?>
-<?mso-contentType ?>
-<FormTemplates xmlns="http://schemas.microsoft.com/sharepoint/v3/contenttype/forms">
-  <Display>DocumentLibraryForm</Display>
-  <Edit>DocumentLibraryForm</Edit>
-  <New>DocumentLibraryForm</New>
-</FormTemplates>
-</file>
-
-<file path=customXml/item2.xml><?xml version="1.0" encoding="utf-8"?>
-<p:properties xmlns:p="http://schemas.microsoft.com/office/2006/metadata/properties" xmlns:xsi="http://www.w3.org/2001/XMLSchema-instance" xmlns:pc="http://schemas.microsoft.com/office/infopath/2007/PartnerControls">
-  <documentManagement/>
-</p:properties>
-</file>
-
-<file path=customXml/item3.xml><?xml version="1.0" encoding="utf-8"?>
 <ct:contentTypeSchema xmlns:ct="http://schemas.microsoft.com/office/2006/metadata/contentType" xmlns:ma="http://schemas.microsoft.com/office/2006/metadata/properties/metaAttributes" ct:_="" ma:_="" ma:contentTypeName="Document" ma:contentTypeID="0x010100F50271A20F7B3C41B827A8F04D548019" ma:contentTypeVersion="2" ma:contentTypeDescription="Create a new document." ma:contentTypeScope="" ma:versionID="0f5b4adeca3fa452dfd663ff4e0777e3">
   <xsd:schema xmlns:xsd="http://www.w3.org/2001/XMLSchema" xmlns:xs="http://www.w3.org/2001/XMLSchema" xmlns:p="http://schemas.microsoft.com/office/2006/metadata/properties" xmlns:ns2="f85c541c-390e-4fa8-b262-5da5c5cfad75" targetNamespace="http://schemas.microsoft.com/office/2006/metadata/properties" ma:root="true" ma:fieldsID="592d4a22e1cc7090506e0998bb31d05e" ns2:_="">
     <xsd:import namespace="f85c541c-390e-4fa8-b262-5da5c5cfad75"/>
@@ -44588,10 +45341,35 @@
 </ct:contentTypeSchema>
 </file>
 
+<file path=customXml/item2.xml><?xml version="1.0" encoding="utf-8"?>
+<p:properties xmlns:p="http://schemas.microsoft.com/office/2006/metadata/properties" xmlns:xsi="http://www.w3.org/2001/XMLSchema-instance" xmlns:pc="http://schemas.microsoft.com/office/infopath/2007/PartnerControls">
+  <documentManagement/>
+</p:properties>
+</file>
+
+<file path=customXml/item3.xml><?xml version="1.0" encoding="utf-8"?>
+<?mso-contentType ?>
+<FormTemplates xmlns="http://schemas.microsoft.com/sharepoint/v3/contenttype/forms">
+  <Display>DocumentLibraryForm</Display>
+  <Edit>DocumentLibraryForm</Edit>
+  <New>DocumentLibraryForm</New>
+</FormTemplates>
+</file>
+
 <file path=customXml/itemProps1.xml><?xml version="1.0" encoding="utf-8"?>
-<ds:datastoreItem xmlns:ds="http://schemas.openxmlformats.org/officeDocument/2006/customXml" ds:itemID="{758FDAC0-319D-4A54-8D8E-1D42CB1F8004}">
+<ds:datastoreItem xmlns:ds="http://schemas.openxmlformats.org/officeDocument/2006/customXml" ds:itemID="{16C79B61-263D-4889-954E-B7F93FBE6617}">
   <ds:schemaRefs>
-    <ds:schemaRef ds:uri="http://schemas.microsoft.com/sharepoint/v3/contenttype/forms"/>
+    <ds:schemaRef ds:uri="http://schemas.microsoft.com/office/2006/metadata/contentType"/>
+    <ds:schemaRef ds:uri="http://schemas.microsoft.com/office/2006/metadata/properties/metaAttributes"/>
+    <ds:schemaRef ds:uri="http://www.w3.org/2001/XMLSchema"/>
+    <ds:schemaRef ds:uri="http://schemas.microsoft.com/office/2006/metadata/properties"/>
+    <ds:schemaRef ds:uri="f85c541c-390e-4fa8-b262-5da5c5cfad75"/>
+    <ds:schemaRef ds:uri="http://schemas.microsoft.com/office/2006/documentManagement/types"/>
+    <ds:schemaRef ds:uri="http://schemas.microsoft.com/office/infopath/2007/PartnerControls"/>
+    <ds:schemaRef ds:uri="http://schemas.openxmlformats.org/package/2006/metadata/core-properties"/>
+    <ds:schemaRef ds:uri="http://purl.org/dc/elements/1.1/"/>
+    <ds:schemaRef ds:uri="http://purl.org/dc/terms/"/>
+    <ds:schemaRef ds:uri="http://schemas.microsoft.com/internal/obd"/>
   </ds:schemaRefs>
 </ds:datastoreItem>
 </file>
@@ -44613,19 +45391,9 @@
 </file>
 
 <file path=customXml/itemProps3.xml><?xml version="1.0" encoding="utf-8"?>
-<ds:datastoreItem xmlns:ds="http://schemas.openxmlformats.org/officeDocument/2006/customXml" ds:itemID="{16C79B61-263D-4889-954E-B7F93FBE6617}">
+<ds:datastoreItem xmlns:ds="http://schemas.openxmlformats.org/officeDocument/2006/customXml" ds:itemID="{758FDAC0-319D-4A54-8D8E-1D42CB1F8004}">
   <ds:schemaRefs>
-    <ds:schemaRef ds:uri="http://schemas.microsoft.com/office/2006/metadata/contentType"/>
-    <ds:schemaRef ds:uri="http://schemas.microsoft.com/office/2006/metadata/properties/metaAttributes"/>
-    <ds:schemaRef ds:uri="http://www.w3.org/2001/XMLSchema"/>
-    <ds:schemaRef ds:uri="http://schemas.microsoft.com/office/2006/metadata/properties"/>
-    <ds:schemaRef ds:uri="f85c541c-390e-4fa8-b262-5da5c5cfad75"/>
-    <ds:schemaRef ds:uri="http://schemas.microsoft.com/office/2006/documentManagement/types"/>
-    <ds:schemaRef ds:uri="http://schemas.microsoft.com/office/infopath/2007/PartnerControls"/>
-    <ds:schemaRef ds:uri="http://schemas.openxmlformats.org/package/2006/metadata/core-properties"/>
-    <ds:schemaRef ds:uri="http://purl.org/dc/elements/1.1/"/>
-    <ds:schemaRef ds:uri="http://purl.org/dc/terms/"/>
-    <ds:schemaRef ds:uri="http://schemas.microsoft.com/internal/obd"/>
+    <ds:schemaRef ds:uri="http://schemas.microsoft.com/sharepoint/v3/contenttype/forms"/>
   </ds:schemaRefs>
 </ds:datastoreItem>
 </file>
</xml_diff>